<commit_message>
Add better diagrams for image representation and sound representation.
</commit_message>
<xml_diff>
--- a/book_contents/ch04_data/01_anatomy_of_tweet/speaker diagram.pptx
+++ b/book_contents/ch04_data/01_anatomy_of_tweet/speaker diagram.pptx
@@ -6,6 +6,7 @@
   </p:sldMasterIdLst>
   <p:sldIdLst>
     <p:sldId id="256" r:id="rId2"/>
+    <p:sldId id="257" r:id="rId3"/>
   </p:sldIdLst>
   <p:sldSz cx="12192000" cy="6858000"/>
   <p:notesSz cx="6858000" cy="9144000"/>
@@ -104,6 +105,11 @@
       </a:defRPr>
     </a:lvl9pPr>
   </p:defaultTextStyle>
+  <p:extLst>
+    <p:ext uri="{EFAFB233-063F-42B5-8137-9DF3F51BA10A}">
+      <p15:sldGuideLst xmlns:p15="http://schemas.microsoft.com/office/powerpoint/2012/main"/>
+    </p:ext>
+  </p:extLst>
 </p:presentation>
 </file>
 
@@ -254,7 +260,7 @@
           <a:p>
             <a:fld id="{6AE22105-B8EF-4FBB-BAA0-3834F2FF81D4}" type="datetimeFigureOut">
               <a:rPr lang="en-US" smtClean="0"/>
-              <a:t>8/23/2022</a:t>
+              <a:t>1/5/2023</a:t>
             </a:fld>
             <a:endParaRPr lang="en-US"/>
           </a:p>
@@ -452,7 +458,7 @@
           <a:p>
             <a:fld id="{6AE22105-B8EF-4FBB-BAA0-3834F2FF81D4}" type="datetimeFigureOut">
               <a:rPr lang="en-US" smtClean="0"/>
-              <a:t>8/23/2022</a:t>
+              <a:t>1/5/2023</a:t>
             </a:fld>
             <a:endParaRPr lang="en-US"/>
           </a:p>
@@ -660,7 +666,7 @@
           <a:p>
             <a:fld id="{6AE22105-B8EF-4FBB-BAA0-3834F2FF81D4}" type="datetimeFigureOut">
               <a:rPr lang="en-US" smtClean="0"/>
-              <a:t>8/23/2022</a:t>
+              <a:t>1/5/2023</a:t>
             </a:fld>
             <a:endParaRPr lang="en-US"/>
           </a:p>
@@ -858,7 +864,7 @@
           <a:p>
             <a:fld id="{6AE22105-B8EF-4FBB-BAA0-3834F2FF81D4}" type="datetimeFigureOut">
               <a:rPr lang="en-US" smtClean="0"/>
-              <a:t>8/23/2022</a:t>
+              <a:t>1/5/2023</a:t>
             </a:fld>
             <a:endParaRPr lang="en-US"/>
           </a:p>
@@ -1133,7 +1139,7 @@
           <a:p>
             <a:fld id="{6AE22105-B8EF-4FBB-BAA0-3834F2FF81D4}" type="datetimeFigureOut">
               <a:rPr lang="en-US" smtClean="0"/>
-              <a:t>8/23/2022</a:t>
+              <a:t>1/5/2023</a:t>
             </a:fld>
             <a:endParaRPr lang="en-US"/>
           </a:p>
@@ -1398,7 +1404,7 @@
           <a:p>
             <a:fld id="{6AE22105-B8EF-4FBB-BAA0-3834F2FF81D4}" type="datetimeFigureOut">
               <a:rPr lang="en-US" smtClean="0"/>
-              <a:t>8/23/2022</a:t>
+              <a:t>1/5/2023</a:t>
             </a:fld>
             <a:endParaRPr lang="en-US"/>
           </a:p>
@@ -1810,7 +1816,7 @@
           <a:p>
             <a:fld id="{6AE22105-B8EF-4FBB-BAA0-3834F2FF81D4}" type="datetimeFigureOut">
               <a:rPr lang="en-US" smtClean="0"/>
-              <a:t>8/23/2022</a:t>
+              <a:t>1/5/2023</a:t>
             </a:fld>
             <a:endParaRPr lang="en-US"/>
           </a:p>
@@ -1951,7 +1957,7 @@
           <a:p>
             <a:fld id="{6AE22105-B8EF-4FBB-BAA0-3834F2FF81D4}" type="datetimeFigureOut">
               <a:rPr lang="en-US" smtClean="0"/>
-              <a:t>8/23/2022</a:t>
+              <a:t>1/5/2023</a:t>
             </a:fld>
             <a:endParaRPr lang="en-US"/>
           </a:p>
@@ -2064,7 +2070,7 @@
           <a:p>
             <a:fld id="{6AE22105-B8EF-4FBB-BAA0-3834F2FF81D4}" type="datetimeFigureOut">
               <a:rPr lang="en-US" smtClean="0"/>
-              <a:t>8/23/2022</a:t>
+              <a:t>1/5/2023</a:t>
             </a:fld>
             <a:endParaRPr lang="en-US"/>
           </a:p>
@@ -2375,7 +2381,7 @@
           <a:p>
             <a:fld id="{6AE22105-B8EF-4FBB-BAA0-3834F2FF81D4}" type="datetimeFigureOut">
               <a:rPr lang="en-US" smtClean="0"/>
-              <a:t>8/23/2022</a:t>
+              <a:t>1/5/2023</a:t>
             </a:fld>
             <a:endParaRPr lang="en-US"/>
           </a:p>
@@ -2663,7 +2669,7 @@
           <a:p>
             <a:fld id="{6AE22105-B8EF-4FBB-BAA0-3834F2FF81D4}" type="datetimeFigureOut">
               <a:rPr lang="en-US" smtClean="0"/>
-              <a:t>8/23/2022</a:t>
+              <a:t>1/5/2023</a:t>
             </a:fld>
             <a:endParaRPr lang="en-US"/>
           </a:p>
@@ -2904,7 +2910,7 @@
           <a:p>
             <a:fld id="{6AE22105-B8EF-4FBB-BAA0-3834F2FF81D4}" type="datetimeFigureOut">
               <a:rPr lang="en-US" smtClean="0"/>
-              <a:t>8/23/2022</a:t>
+              <a:t>1/5/2023</a:t>
             </a:fld>
             <a:endParaRPr lang="en-US"/>
           </a:p>
@@ -3461,6 +3467,771 @@
 </p:sld>
 </file>
 
+<file path=ppt/slides/slide2.xml><?xml version="1.0" encoding="utf-8"?>
+<p:sld xmlns:a="http://schemas.openxmlformats.org/drawingml/2006/main" xmlns:r="http://schemas.openxmlformats.org/officeDocument/2006/relationships" xmlns:p="http://schemas.openxmlformats.org/presentationml/2006/main">
+  <p:cSld>
+    <p:spTree>
+      <p:nvGrpSpPr>
+        <p:cNvPr id="1" name=""/>
+        <p:cNvGrpSpPr/>
+        <p:nvPr/>
+      </p:nvGrpSpPr>
+      <p:grpSpPr>
+        <a:xfrm>
+          <a:off x="0" y="0"/>
+          <a:ext cx="0" cy="0"/>
+          <a:chOff x="0" y="0"/>
+          <a:chExt cx="0" cy="0"/>
+        </a:xfrm>
+      </p:grpSpPr>
+      <p:sp>
+        <p:nvSpPr>
+          <p:cNvPr id="12" name="Freeform: Shape 11">
+            <a:extLst>
+              <a:ext uri="{FF2B5EF4-FFF2-40B4-BE49-F238E27FC236}">
+                <a16:creationId xmlns:a16="http://schemas.microsoft.com/office/drawing/2014/main" id="{6242C37B-EAAF-D860-2574-D014608EA7B0}"/>
+              </a:ext>
+            </a:extLst>
+          </p:cNvPr>
+          <p:cNvSpPr/>
+          <p:nvPr/>
+        </p:nvSpPr>
+        <p:spPr>
+          <a:xfrm>
+            <a:off x="1427384" y="4512978"/>
+            <a:ext cx="5313872" cy="1441025"/>
+          </a:xfrm>
+          <a:custGeom>
+            <a:avLst/>
+            <a:gdLst>
+              <a:gd name="connsiteX0" fmla="*/ 0 w 5313872"/>
+              <a:gd name="connsiteY0" fmla="*/ 1337416 h 1441025"/>
+              <a:gd name="connsiteX1" fmla="*/ 1035170 w 5313872"/>
+              <a:gd name="connsiteY1" fmla="*/ 322 h 1441025"/>
+              <a:gd name="connsiteX2" fmla="*/ 2441275 w 5313872"/>
+              <a:gd name="connsiteY2" fmla="*/ 1440933 h 1441025"/>
+              <a:gd name="connsiteX3" fmla="*/ 3804249 w 5313872"/>
+              <a:gd name="connsiteY3" fmla="*/ 77960 h 1441025"/>
+              <a:gd name="connsiteX4" fmla="*/ 5313872 w 5313872"/>
+              <a:gd name="connsiteY4" fmla="*/ 1311537 h 1441025"/>
+            </a:gdLst>
+            <a:ahLst/>
+            <a:cxnLst>
+              <a:cxn ang="0">
+                <a:pos x="connsiteX0" y="connsiteY0"/>
+              </a:cxn>
+              <a:cxn ang="0">
+                <a:pos x="connsiteX1" y="connsiteY1"/>
+              </a:cxn>
+              <a:cxn ang="0">
+                <a:pos x="connsiteX2" y="connsiteY2"/>
+              </a:cxn>
+              <a:cxn ang="0">
+                <a:pos x="connsiteX3" y="connsiteY3"/>
+              </a:cxn>
+              <a:cxn ang="0">
+                <a:pos x="connsiteX4" y="connsiteY4"/>
+              </a:cxn>
+            </a:cxnLst>
+            <a:rect l="l" t="t" r="r" b="b"/>
+            <a:pathLst>
+              <a:path w="5313872" h="1441025">
+                <a:moveTo>
+                  <a:pt x="0" y="1337416"/>
+                </a:moveTo>
+                <a:cubicBezTo>
+                  <a:pt x="314145" y="660242"/>
+                  <a:pt x="628291" y="-16931"/>
+                  <a:pt x="1035170" y="322"/>
+                </a:cubicBezTo>
+                <a:cubicBezTo>
+                  <a:pt x="1442049" y="17575"/>
+                  <a:pt x="1979762" y="1427993"/>
+                  <a:pt x="2441275" y="1440933"/>
+                </a:cubicBezTo>
+                <a:cubicBezTo>
+                  <a:pt x="2902788" y="1453873"/>
+                  <a:pt x="3325483" y="99526"/>
+                  <a:pt x="3804249" y="77960"/>
+                </a:cubicBezTo>
+                <a:cubicBezTo>
+                  <a:pt x="4283015" y="56394"/>
+                  <a:pt x="4798443" y="683965"/>
+                  <a:pt x="5313872" y="1311537"/>
+                </a:cubicBezTo>
+              </a:path>
+            </a:pathLst>
+          </a:custGeom>
+          <a:noFill/>
+        </p:spPr>
+        <p:style>
+          <a:lnRef idx="2">
+            <a:schemeClr val="accent1">
+              <a:shade val="50000"/>
+            </a:schemeClr>
+          </a:lnRef>
+          <a:fillRef idx="1">
+            <a:schemeClr val="accent1"/>
+          </a:fillRef>
+          <a:effectRef idx="0">
+            <a:schemeClr val="accent1"/>
+          </a:effectRef>
+          <a:fontRef idx="minor">
+            <a:schemeClr val="lt1"/>
+          </a:fontRef>
+        </p:style>
+        <p:txBody>
+          <a:bodyPr rtlCol="0" anchor="ctr"/>
+          <a:lstStyle/>
+          <a:p>
+            <a:pPr algn="ctr"/>
+            <a:endParaRPr lang="en-US"/>
+          </a:p>
+        </p:txBody>
+      </p:sp>
+      <p:sp>
+        <p:nvSpPr>
+          <p:cNvPr id="4" name="Freeform: Shape 3">
+            <a:extLst>
+              <a:ext uri="{FF2B5EF4-FFF2-40B4-BE49-F238E27FC236}">
+                <a16:creationId xmlns:a16="http://schemas.microsoft.com/office/drawing/2014/main" id="{87ED97EF-EC1E-EBF3-CB65-7F2343352145}"/>
+              </a:ext>
+            </a:extLst>
+          </p:cNvPr>
+          <p:cNvSpPr/>
+          <p:nvPr/>
+        </p:nvSpPr>
+        <p:spPr>
+          <a:xfrm>
+            <a:off x="2811828" y="1958227"/>
+            <a:ext cx="5313872" cy="1441025"/>
+          </a:xfrm>
+          <a:custGeom>
+            <a:avLst/>
+            <a:gdLst>
+              <a:gd name="connsiteX0" fmla="*/ 0 w 5313872"/>
+              <a:gd name="connsiteY0" fmla="*/ 1337416 h 1441025"/>
+              <a:gd name="connsiteX1" fmla="*/ 1035170 w 5313872"/>
+              <a:gd name="connsiteY1" fmla="*/ 322 h 1441025"/>
+              <a:gd name="connsiteX2" fmla="*/ 2441275 w 5313872"/>
+              <a:gd name="connsiteY2" fmla="*/ 1440933 h 1441025"/>
+              <a:gd name="connsiteX3" fmla="*/ 3804249 w 5313872"/>
+              <a:gd name="connsiteY3" fmla="*/ 77960 h 1441025"/>
+              <a:gd name="connsiteX4" fmla="*/ 5313872 w 5313872"/>
+              <a:gd name="connsiteY4" fmla="*/ 1311537 h 1441025"/>
+            </a:gdLst>
+            <a:ahLst/>
+            <a:cxnLst>
+              <a:cxn ang="0">
+                <a:pos x="connsiteX0" y="connsiteY0"/>
+              </a:cxn>
+              <a:cxn ang="0">
+                <a:pos x="connsiteX1" y="connsiteY1"/>
+              </a:cxn>
+              <a:cxn ang="0">
+                <a:pos x="connsiteX2" y="connsiteY2"/>
+              </a:cxn>
+              <a:cxn ang="0">
+                <a:pos x="connsiteX3" y="connsiteY3"/>
+              </a:cxn>
+              <a:cxn ang="0">
+                <a:pos x="connsiteX4" y="connsiteY4"/>
+              </a:cxn>
+            </a:cxnLst>
+            <a:rect l="l" t="t" r="r" b="b"/>
+            <a:pathLst>
+              <a:path w="5313872" h="1441025">
+                <a:moveTo>
+                  <a:pt x="0" y="1337416"/>
+                </a:moveTo>
+                <a:cubicBezTo>
+                  <a:pt x="314145" y="660242"/>
+                  <a:pt x="628291" y="-16931"/>
+                  <a:pt x="1035170" y="322"/>
+                </a:cubicBezTo>
+                <a:cubicBezTo>
+                  <a:pt x="1442049" y="17575"/>
+                  <a:pt x="1979762" y="1427993"/>
+                  <a:pt x="2441275" y="1440933"/>
+                </a:cubicBezTo>
+                <a:cubicBezTo>
+                  <a:pt x="2902788" y="1453873"/>
+                  <a:pt x="3325483" y="99526"/>
+                  <a:pt x="3804249" y="77960"/>
+                </a:cubicBezTo>
+                <a:cubicBezTo>
+                  <a:pt x="4283015" y="56394"/>
+                  <a:pt x="4798443" y="683965"/>
+                  <a:pt x="5313872" y="1311537"/>
+                </a:cubicBezTo>
+              </a:path>
+            </a:pathLst>
+          </a:custGeom>
+          <a:noFill/>
+        </p:spPr>
+        <p:style>
+          <a:lnRef idx="2">
+            <a:schemeClr val="accent1">
+              <a:shade val="50000"/>
+            </a:schemeClr>
+          </a:lnRef>
+          <a:fillRef idx="1">
+            <a:schemeClr val="accent1"/>
+          </a:fillRef>
+          <a:effectRef idx="0">
+            <a:schemeClr val="accent1"/>
+          </a:effectRef>
+          <a:fontRef idx="minor">
+            <a:schemeClr val="lt1"/>
+          </a:fontRef>
+        </p:style>
+        <p:txBody>
+          <a:bodyPr rtlCol="0" anchor="ctr"/>
+          <a:lstStyle/>
+          <a:p>
+            <a:pPr algn="ctr"/>
+            <a:endParaRPr lang="en-US"/>
+          </a:p>
+        </p:txBody>
+      </p:sp>
+      <p:sp>
+        <p:nvSpPr>
+          <p:cNvPr id="18" name="Rectangle 17">
+            <a:extLst>
+              <a:ext uri="{FF2B5EF4-FFF2-40B4-BE49-F238E27FC236}">
+                <a16:creationId xmlns:a16="http://schemas.microsoft.com/office/drawing/2014/main" id="{DD51D4CD-C261-6C7E-CD7D-B0DC5E3AE2E0}"/>
+              </a:ext>
+            </a:extLst>
+          </p:cNvPr>
+          <p:cNvSpPr/>
+          <p:nvPr/>
+        </p:nvSpPr>
+        <p:spPr>
+          <a:xfrm>
+            <a:off x="1145511" y="1320800"/>
+            <a:ext cx="2433983" cy="4958080"/>
+          </a:xfrm>
+          <a:prstGeom prst="rect">
+            <a:avLst/>
+          </a:prstGeom>
+          <a:solidFill>
+            <a:schemeClr val="bg1"/>
+          </a:solidFill>
+          <a:ln>
+            <a:noFill/>
+          </a:ln>
+        </p:spPr>
+        <p:style>
+          <a:lnRef idx="2">
+            <a:schemeClr val="accent1">
+              <a:shade val="50000"/>
+            </a:schemeClr>
+          </a:lnRef>
+          <a:fillRef idx="1">
+            <a:schemeClr val="accent1"/>
+          </a:fillRef>
+          <a:effectRef idx="0">
+            <a:schemeClr val="accent1"/>
+          </a:effectRef>
+          <a:fontRef idx="minor">
+            <a:schemeClr val="lt1"/>
+          </a:fontRef>
+        </p:style>
+        <p:txBody>
+          <a:bodyPr rtlCol="0" anchor="ctr"/>
+          <a:lstStyle/>
+          <a:p>
+            <a:pPr algn="ctr"/>
+            <a:endParaRPr lang="en-US"/>
+          </a:p>
+        </p:txBody>
+      </p:sp>
+      <p:sp>
+        <p:nvSpPr>
+          <p:cNvPr id="9" name="Oval 8">
+            <a:extLst>
+              <a:ext uri="{FF2B5EF4-FFF2-40B4-BE49-F238E27FC236}">
+                <a16:creationId xmlns:a16="http://schemas.microsoft.com/office/drawing/2014/main" id="{7B0B5740-FE3C-0F72-F2E5-A92E5F3E5199}"/>
+              </a:ext>
+            </a:extLst>
+          </p:cNvPr>
+          <p:cNvSpPr/>
+          <p:nvPr/>
+        </p:nvSpPr>
+        <p:spPr>
+          <a:xfrm>
+            <a:off x="2326640" y="1455978"/>
+            <a:ext cx="651774" cy="1595621"/>
+          </a:xfrm>
+          <a:prstGeom prst="ellipse">
+            <a:avLst/>
+          </a:prstGeom>
+          <a:solidFill>
+            <a:schemeClr val="accent1">
+              <a:lumMod val="60000"/>
+              <a:lumOff val="40000"/>
+            </a:schemeClr>
+          </a:solidFill>
+        </p:spPr>
+        <p:style>
+          <a:lnRef idx="2">
+            <a:schemeClr val="accent1">
+              <a:shade val="50000"/>
+            </a:schemeClr>
+          </a:lnRef>
+          <a:fillRef idx="1">
+            <a:schemeClr val="accent1"/>
+          </a:fillRef>
+          <a:effectRef idx="0">
+            <a:schemeClr val="accent1"/>
+          </a:effectRef>
+          <a:fontRef idx="minor">
+            <a:schemeClr val="lt1"/>
+          </a:fontRef>
+        </p:style>
+        <p:txBody>
+          <a:bodyPr rtlCol="0" anchor="ctr"/>
+          <a:lstStyle/>
+          <a:p>
+            <a:pPr algn="ctr"/>
+            <a:endParaRPr lang="en-US"/>
+          </a:p>
+        </p:txBody>
+      </p:sp>
+      <p:sp>
+        <p:nvSpPr>
+          <p:cNvPr id="5" name="Rectangle 4">
+            <a:extLst>
+              <a:ext uri="{FF2B5EF4-FFF2-40B4-BE49-F238E27FC236}">
+                <a16:creationId xmlns:a16="http://schemas.microsoft.com/office/drawing/2014/main" id="{B2C18D22-46C5-A83F-3CE3-2DCAC9A0A75A}"/>
+              </a:ext>
+            </a:extLst>
+          </p:cNvPr>
+          <p:cNvSpPr/>
+          <p:nvPr/>
+        </p:nvSpPr>
+        <p:spPr>
+          <a:xfrm>
+            <a:off x="3655108" y="1448183"/>
+            <a:ext cx="5072332" cy="2173857"/>
+          </a:xfrm>
+          <a:prstGeom prst="rect">
+            <a:avLst/>
+          </a:prstGeom>
+          <a:noFill/>
+        </p:spPr>
+        <p:style>
+          <a:lnRef idx="2">
+            <a:schemeClr val="accent1">
+              <a:shade val="50000"/>
+            </a:schemeClr>
+          </a:lnRef>
+          <a:fillRef idx="1">
+            <a:schemeClr val="accent1"/>
+          </a:fillRef>
+          <a:effectRef idx="0">
+            <a:schemeClr val="accent1"/>
+          </a:effectRef>
+          <a:fontRef idx="minor">
+            <a:schemeClr val="lt1"/>
+          </a:fontRef>
+        </p:style>
+        <p:txBody>
+          <a:bodyPr rtlCol="0" anchor="ctr"/>
+          <a:lstStyle/>
+          <a:p>
+            <a:pPr algn="ctr"/>
+            <a:endParaRPr lang="en-US"/>
+          </a:p>
+        </p:txBody>
+      </p:sp>
+      <p:sp>
+        <p:nvSpPr>
+          <p:cNvPr id="7" name="Arrow: Left 6">
+            <a:extLst>
+              <a:ext uri="{FF2B5EF4-FFF2-40B4-BE49-F238E27FC236}">
+                <a16:creationId xmlns:a16="http://schemas.microsoft.com/office/drawing/2014/main" id="{6518620B-2D25-70F5-BBC0-1DA7A881D075}"/>
+              </a:ext>
+            </a:extLst>
+          </p:cNvPr>
+          <p:cNvSpPr/>
+          <p:nvPr/>
+        </p:nvSpPr>
+        <p:spPr>
+          <a:xfrm>
+            <a:off x="3388360" y="1749719"/>
+            <a:ext cx="518160" cy="434514"/>
+          </a:xfrm>
+          <a:prstGeom prst="leftArrow">
+            <a:avLst/>
+          </a:prstGeom>
+          <a:solidFill>
+            <a:srgbClr val="FF0000"/>
+          </a:solidFill>
+        </p:spPr>
+        <p:style>
+          <a:lnRef idx="2">
+            <a:schemeClr val="accent1">
+              <a:shade val="50000"/>
+            </a:schemeClr>
+          </a:lnRef>
+          <a:fillRef idx="1">
+            <a:schemeClr val="accent1"/>
+          </a:fillRef>
+          <a:effectRef idx="0">
+            <a:schemeClr val="accent1"/>
+          </a:effectRef>
+          <a:fontRef idx="minor">
+            <a:schemeClr val="lt1"/>
+          </a:fontRef>
+        </p:style>
+        <p:txBody>
+          <a:bodyPr rtlCol="0" anchor="ctr"/>
+          <a:lstStyle/>
+          <a:p>
+            <a:pPr algn="ctr"/>
+            <a:endParaRPr lang="en-US"/>
+          </a:p>
+        </p:txBody>
+      </p:sp>
+      <p:sp>
+        <p:nvSpPr>
+          <p:cNvPr id="8" name="Oval 7">
+            <a:extLst>
+              <a:ext uri="{FF2B5EF4-FFF2-40B4-BE49-F238E27FC236}">
+                <a16:creationId xmlns:a16="http://schemas.microsoft.com/office/drawing/2014/main" id="{BB08FCCC-91FF-06B5-B877-1C5AF26DB0B7}"/>
+              </a:ext>
+            </a:extLst>
+          </p:cNvPr>
+          <p:cNvSpPr/>
+          <p:nvPr/>
+        </p:nvSpPr>
+        <p:spPr>
+          <a:xfrm>
+            <a:off x="2529840" y="2045258"/>
+            <a:ext cx="162560" cy="345440"/>
+          </a:xfrm>
+          <a:prstGeom prst="ellipse">
+            <a:avLst/>
+          </a:prstGeom>
+        </p:spPr>
+        <p:style>
+          <a:lnRef idx="2">
+            <a:schemeClr val="accent1">
+              <a:shade val="50000"/>
+            </a:schemeClr>
+          </a:lnRef>
+          <a:fillRef idx="1">
+            <a:schemeClr val="accent1"/>
+          </a:fillRef>
+          <a:effectRef idx="0">
+            <a:schemeClr val="accent1"/>
+          </a:effectRef>
+          <a:fontRef idx="minor">
+            <a:schemeClr val="lt1"/>
+          </a:fontRef>
+        </p:style>
+        <p:txBody>
+          <a:bodyPr rtlCol="0" anchor="ctr"/>
+          <a:lstStyle/>
+          <a:p>
+            <a:pPr algn="ctr"/>
+            <a:endParaRPr lang="en-US"/>
+          </a:p>
+        </p:txBody>
+      </p:sp>
+      <p:sp>
+        <p:nvSpPr>
+          <p:cNvPr id="10" name="Oval 9">
+            <a:extLst>
+              <a:ext uri="{FF2B5EF4-FFF2-40B4-BE49-F238E27FC236}">
+                <a16:creationId xmlns:a16="http://schemas.microsoft.com/office/drawing/2014/main" id="{5F1F91D1-D8B5-8D98-EC20-6E43310CB699}"/>
+              </a:ext>
+            </a:extLst>
+          </p:cNvPr>
+          <p:cNvSpPr/>
+          <p:nvPr/>
+        </p:nvSpPr>
+        <p:spPr>
+          <a:xfrm>
+            <a:off x="2628948" y="3965892"/>
+            <a:ext cx="651774" cy="1595621"/>
+          </a:xfrm>
+          <a:prstGeom prst="ellipse">
+            <a:avLst/>
+          </a:prstGeom>
+          <a:solidFill>
+            <a:schemeClr val="accent1">
+              <a:lumMod val="60000"/>
+              <a:lumOff val="40000"/>
+            </a:schemeClr>
+          </a:solidFill>
+        </p:spPr>
+        <p:style>
+          <a:lnRef idx="2">
+            <a:schemeClr val="accent1">
+              <a:shade val="50000"/>
+            </a:schemeClr>
+          </a:lnRef>
+          <a:fillRef idx="1">
+            <a:schemeClr val="accent1"/>
+          </a:fillRef>
+          <a:effectRef idx="0">
+            <a:schemeClr val="accent1"/>
+          </a:effectRef>
+          <a:fontRef idx="minor">
+            <a:schemeClr val="lt1"/>
+          </a:fontRef>
+        </p:style>
+        <p:txBody>
+          <a:bodyPr rtlCol="0" anchor="ctr"/>
+          <a:lstStyle/>
+          <a:p>
+            <a:pPr algn="ctr"/>
+            <a:endParaRPr lang="en-US"/>
+          </a:p>
+        </p:txBody>
+      </p:sp>
+      <p:sp>
+        <p:nvSpPr>
+          <p:cNvPr id="11" name="Rectangle 10">
+            <a:extLst>
+              <a:ext uri="{FF2B5EF4-FFF2-40B4-BE49-F238E27FC236}">
+                <a16:creationId xmlns:a16="http://schemas.microsoft.com/office/drawing/2014/main" id="{D9486605-2FBE-DA6E-091E-2D2C4CC4B455}"/>
+              </a:ext>
+            </a:extLst>
+          </p:cNvPr>
+          <p:cNvSpPr/>
+          <p:nvPr/>
+        </p:nvSpPr>
+        <p:spPr>
+          <a:xfrm>
+            <a:off x="3766868" y="3946338"/>
+            <a:ext cx="5072332" cy="2173857"/>
+          </a:xfrm>
+          <a:prstGeom prst="rect">
+            <a:avLst/>
+          </a:prstGeom>
+          <a:noFill/>
+        </p:spPr>
+        <p:style>
+          <a:lnRef idx="2">
+            <a:schemeClr val="accent1">
+              <a:shade val="50000"/>
+            </a:schemeClr>
+          </a:lnRef>
+          <a:fillRef idx="1">
+            <a:schemeClr val="accent1"/>
+          </a:fillRef>
+          <a:effectRef idx="0">
+            <a:schemeClr val="accent1"/>
+          </a:effectRef>
+          <a:fontRef idx="minor">
+            <a:schemeClr val="lt1"/>
+          </a:fontRef>
+        </p:style>
+        <p:txBody>
+          <a:bodyPr rtlCol="0" anchor="ctr"/>
+          <a:lstStyle/>
+          <a:p>
+            <a:pPr algn="ctr"/>
+            <a:endParaRPr lang="en-US"/>
+          </a:p>
+        </p:txBody>
+      </p:sp>
+      <p:sp>
+        <p:nvSpPr>
+          <p:cNvPr id="13" name="Arrow: Right 12">
+            <a:extLst>
+              <a:ext uri="{FF2B5EF4-FFF2-40B4-BE49-F238E27FC236}">
+                <a16:creationId xmlns:a16="http://schemas.microsoft.com/office/drawing/2014/main" id="{1A5D48CD-4E35-74BE-BE7D-FF0275379C1D}"/>
+              </a:ext>
+            </a:extLst>
+          </p:cNvPr>
+          <p:cNvSpPr/>
+          <p:nvPr/>
+        </p:nvSpPr>
+        <p:spPr>
+          <a:xfrm>
+            <a:off x="3647440" y="5682611"/>
+            <a:ext cx="436880" cy="426720"/>
+          </a:xfrm>
+          <a:prstGeom prst="rightArrow">
+            <a:avLst/>
+          </a:prstGeom>
+        </p:spPr>
+        <p:style>
+          <a:lnRef idx="2">
+            <a:schemeClr val="accent1">
+              <a:shade val="50000"/>
+            </a:schemeClr>
+          </a:lnRef>
+          <a:fillRef idx="1">
+            <a:schemeClr val="accent1"/>
+          </a:fillRef>
+          <a:effectRef idx="0">
+            <a:schemeClr val="accent1"/>
+          </a:effectRef>
+          <a:fontRef idx="minor">
+            <a:schemeClr val="lt1"/>
+          </a:fontRef>
+        </p:style>
+        <p:txBody>
+          <a:bodyPr rtlCol="0" anchor="ctr"/>
+          <a:lstStyle/>
+          <a:p>
+            <a:pPr algn="ctr"/>
+            <a:endParaRPr lang="en-US"/>
+          </a:p>
+        </p:txBody>
+      </p:sp>
+      <p:sp>
+        <p:nvSpPr>
+          <p:cNvPr id="15" name="Oval 14">
+            <a:extLst>
+              <a:ext uri="{FF2B5EF4-FFF2-40B4-BE49-F238E27FC236}">
+                <a16:creationId xmlns:a16="http://schemas.microsoft.com/office/drawing/2014/main" id="{6A7C3BF2-143A-B1D2-5A20-FA98A8EE595D}"/>
+              </a:ext>
+            </a:extLst>
+          </p:cNvPr>
+          <p:cNvSpPr/>
+          <p:nvPr/>
+        </p:nvSpPr>
+        <p:spPr>
+          <a:xfrm>
+            <a:off x="2832148" y="4555172"/>
+            <a:ext cx="162560" cy="345440"/>
+          </a:xfrm>
+          <a:prstGeom prst="ellipse">
+            <a:avLst/>
+          </a:prstGeom>
+        </p:spPr>
+        <p:style>
+          <a:lnRef idx="2">
+            <a:schemeClr val="accent1">
+              <a:shade val="50000"/>
+            </a:schemeClr>
+          </a:lnRef>
+          <a:fillRef idx="1">
+            <a:schemeClr val="accent1"/>
+          </a:fillRef>
+          <a:effectRef idx="0">
+            <a:schemeClr val="accent1"/>
+          </a:effectRef>
+          <a:fontRef idx="minor">
+            <a:schemeClr val="lt1"/>
+          </a:fontRef>
+        </p:style>
+        <p:txBody>
+          <a:bodyPr rtlCol="0" anchor="ctr"/>
+          <a:lstStyle/>
+          <a:p>
+            <a:pPr algn="ctr"/>
+            <a:endParaRPr lang="en-US"/>
+          </a:p>
+        </p:txBody>
+      </p:sp>
+      <p:sp>
+        <p:nvSpPr>
+          <p:cNvPr id="16" name="Arc 15">
+            <a:extLst>
+              <a:ext uri="{FF2B5EF4-FFF2-40B4-BE49-F238E27FC236}">
+                <a16:creationId xmlns:a16="http://schemas.microsoft.com/office/drawing/2014/main" id="{B4A1B7E3-7466-A377-A8A9-E2D2032241AB}"/>
+              </a:ext>
+            </a:extLst>
+          </p:cNvPr>
+          <p:cNvSpPr/>
+          <p:nvPr/>
+        </p:nvSpPr>
+        <p:spPr>
+          <a:xfrm rot="12291244">
+            <a:off x="2073129" y="3579814"/>
+            <a:ext cx="1196388" cy="1814292"/>
+          </a:xfrm>
+          <a:prstGeom prst="arc">
+            <a:avLst/>
+          </a:prstGeom>
+        </p:spPr>
+        <p:style>
+          <a:lnRef idx="1">
+            <a:schemeClr val="accent1"/>
+          </a:lnRef>
+          <a:fillRef idx="0">
+            <a:schemeClr val="accent1"/>
+          </a:fillRef>
+          <a:effectRef idx="0">
+            <a:schemeClr val="accent1"/>
+          </a:effectRef>
+          <a:fontRef idx="minor">
+            <a:schemeClr val="tx1"/>
+          </a:fontRef>
+        </p:style>
+        <p:txBody>
+          <a:bodyPr rtlCol="0" anchor="ctr"/>
+          <a:lstStyle/>
+          <a:p>
+            <a:pPr algn="ctr"/>
+            <a:endParaRPr lang="en-US"/>
+          </a:p>
+        </p:txBody>
+      </p:sp>
+      <p:sp>
+        <p:nvSpPr>
+          <p:cNvPr id="17" name="Arc 16">
+            <a:extLst>
+              <a:ext uri="{FF2B5EF4-FFF2-40B4-BE49-F238E27FC236}">
+                <a16:creationId xmlns:a16="http://schemas.microsoft.com/office/drawing/2014/main" id="{0864F886-70B0-D7EA-1993-B162BF9E5F42}"/>
+              </a:ext>
+            </a:extLst>
+          </p:cNvPr>
+          <p:cNvSpPr/>
+          <p:nvPr/>
+        </p:nvSpPr>
+        <p:spPr>
+          <a:xfrm rot="12291244">
+            <a:off x="2308640" y="1069900"/>
+            <a:ext cx="1196388" cy="1814292"/>
+          </a:xfrm>
+          <a:prstGeom prst="arc">
+            <a:avLst/>
+          </a:prstGeom>
+        </p:spPr>
+        <p:style>
+          <a:lnRef idx="1">
+            <a:schemeClr val="accent1"/>
+          </a:lnRef>
+          <a:fillRef idx="0">
+            <a:schemeClr val="accent1"/>
+          </a:fillRef>
+          <a:effectRef idx="0">
+            <a:schemeClr val="accent1"/>
+          </a:effectRef>
+          <a:fontRef idx="minor">
+            <a:schemeClr val="tx1"/>
+          </a:fontRef>
+        </p:style>
+        <p:txBody>
+          <a:bodyPr rtlCol="0" anchor="ctr"/>
+          <a:lstStyle/>
+          <a:p>
+            <a:pPr algn="ctr"/>
+            <a:endParaRPr lang="en-US"/>
+          </a:p>
+        </p:txBody>
+      </p:sp>
+    </p:spTree>
+    <p:extLst>
+      <p:ext uri="{BB962C8B-B14F-4D97-AF65-F5344CB8AC3E}">
+        <p14:creationId xmlns:p14="http://schemas.microsoft.com/office/powerpoint/2010/main" val="3308410872"/>
+      </p:ext>
+    </p:extLst>
+  </p:cSld>
+  <p:clrMapOvr>
+    <a:masterClrMapping/>
+  </p:clrMapOvr>
+</p:sld>
+</file>
+
 <file path=ppt/theme/theme1.xml><?xml version="1.0" encoding="utf-8"?>
 <a:theme xmlns:a="http://schemas.openxmlformats.org/drawingml/2006/main" name="Office Theme">
   <a:themeElements>

</xml_diff>